<commit_message>
Age collapse data added
</commit_message>
<xml_diff>
--- a/presentation/figures.pptx
+++ b/presentation/figures.pptx
@@ -6,6 +6,7 @@
   </p:sldMasterIdLst>
   <p:sldIdLst>
     <p:sldId id="256" r:id="rId2"/>
+    <p:sldId id="257" r:id="rId3"/>
   </p:sldIdLst>
   <p:sldSz cx="12192000" cy="6858000"/>
   <p:notesSz cx="6858000" cy="9144000"/>
@@ -261,7 +262,7 @@
           <a:p>
             <a:fld id="{2E744E46-B1CE-4587-808F-3330F6A99A44}" type="datetimeFigureOut">
               <a:rPr lang="de-DE" smtClean="0"/>
-              <a:t>26.02.2021</a:t>
+              <a:t>04.03.2021</a:t>
             </a:fld>
             <a:endParaRPr lang="de-DE"/>
           </a:p>
@@ -461,7 +462,7 @@
           <a:p>
             <a:fld id="{2E744E46-B1CE-4587-808F-3330F6A99A44}" type="datetimeFigureOut">
               <a:rPr lang="de-DE" smtClean="0"/>
-              <a:t>26.02.2021</a:t>
+              <a:t>04.03.2021</a:t>
             </a:fld>
             <a:endParaRPr lang="de-DE"/>
           </a:p>
@@ -671,7 +672,7 @@
           <a:p>
             <a:fld id="{2E744E46-B1CE-4587-808F-3330F6A99A44}" type="datetimeFigureOut">
               <a:rPr lang="de-DE" smtClean="0"/>
-              <a:t>26.02.2021</a:t>
+              <a:t>04.03.2021</a:t>
             </a:fld>
             <a:endParaRPr lang="de-DE"/>
           </a:p>
@@ -871,7 +872,7 @@
           <a:p>
             <a:fld id="{2E744E46-B1CE-4587-808F-3330F6A99A44}" type="datetimeFigureOut">
               <a:rPr lang="de-DE" smtClean="0"/>
-              <a:t>26.02.2021</a:t>
+              <a:t>04.03.2021</a:t>
             </a:fld>
             <a:endParaRPr lang="de-DE"/>
           </a:p>
@@ -1147,7 +1148,7 @@
           <a:p>
             <a:fld id="{2E744E46-B1CE-4587-808F-3330F6A99A44}" type="datetimeFigureOut">
               <a:rPr lang="de-DE" smtClean="0"/>
-              <a:t>26.02.2021</a:t>
+              <a:t>04.03.2021</a:t>
             </a:fld>
             <a:endParaRPr lang="de-DE"/>
           </a:p>
@@ -1415,7 +1416,7 @@
           <a:p>
             <a:fld id="{2E744E46-B1CE-4587-808F-3330F6A99A44}" type="datetimeFigureOut">
               <a:rPr lang="de-DE" smtClean="0"/>
-              <a:t>26.02.2021</a:t>
+              <a:t>04.03.2021</a:t>
             </a:fld>
             <a:endParaRPr lang="de-DE"/>
           </a:p>
@@ -1830,7 +1831,7 @@
           <a:p>
             <a:fld id="{2E744E46-B1CE-4587-808F-3330F6A99A44}" type="datetimeFigureOut">
               <a:rPr lang="de-DE" smtClean="0"/>
-              <a:t>26.02.2021</a:t>
+              <a:t>04.03.2021</a:t>
             </a:fld>
             <a:endParaRPr lang="de-DE"/>
           </a:p>
@@ -1972,7 +1973,7 @@
           <a:p>
             <a:fld id="{2E744E46-B1CE-4587-808F-3330F6A99A44}" type="datetimeFigureOut">
               <a:rPr lang="de-DE" smtClean="0"/>
-              <a:t>26.02.2021</a:t>
+              <a:t>04.03.2021</a:t>
             </a:fld>
             <a:endParaRPr lang="de-DE"/>
           </a:p>
@@ -2085,7 +2086,7 @@
           <a:p>
             <a:fld id="{2E744E46-B1CE-4587-808F-3330F6A99A44}" type="datetimeFigureOut">
               <a:rPr lang="de-DE" smtClean="0"/>
-              <a:t>26.02.2021</a:t>
+              <a:t>04.03.2021</a:t>
             </a:fld>
             <a:endParaRPr lang="de-DE"/>
           </a:p>
@@ -2398,7 +2399,7 @@
           <a:p>
             <a:fld id="{2E744E46-B1CE-4587-808F-3330F6A99A44}" type="datetimeFigureOut">
               <a:rPr lang="de-DE" smtClean="0"/>
-              <a:t>26.02.2021</a:t>
+              <a:t>04.03.2021</a:t>
             </a:fld>
             <a:endParaRPr lang="de-DE"/>
           </a:p>
@@ -2687,7 +2688,7 @@
           <a:p>
             <a:fld id="{2E744E46-B1CE-4587-808F-3330F6A99A44}" type="datetimeFigureOut">
               <a:rPr lang="de-DE" smtClean="0"/>
-              <a:t>26.02.2021</a:t>
+              <a:t>04.03.2021</a:t>
             </a:fld>
             <a:endParaRPr lang="de-DE"/>
           </a:p>
@@ -2930,7 +2931,7 @@
           <a:p>
             <a:fld id="{2E744E46-B1CE-4587-808F-3330F6A99A44}" type="datetimeFigureOut">
               <a:rPr lang="de-DE" smtClean="0"/>
-              <a:t>26.02.2021</a:t>
+              <a:t>04.03.2021</a:t>
             </a:fld>
             <a:endParaRPr lang="de-DE"/>
           </a:p>
@@ -4012,8 +4013,8 @@
           </a:p>
         </p:txBody>
       </p:sp>
-      <mc:AlternateContent xmlns:mc="http://schemas.openxmlformats.org/markup-compatibility/2006">
-        <mc:Choice xmlns:a14="http://schemas.microsoft.com/office/drawing/2010/main" Requires="a14">
+      <mc:AlternateContent xmlns:mc="http://schemas.openxmlformats.org/markup-compatibility/2006" xmlns:a14="http://schemas.microsoft.com/office/drawing/2010/main">
+        <mc:Choice Requires="a14">
           <p:sp>
             <p:nvSpPr>
               <p:cNvPr id="33" name="TextBox 32">
@@ -4096,7 +4097,7 @@
             </p:txBody>
           </p:sp>
         </mc:Choice>
-        <mc:Fallback>
+        <mc:Fallback xmlns="">
           <p:sp>
             <p:nvSpPr>
               <p:cNvPr id="33" name="TextBox 32">
@@ -4180,8 +4181,8 @@
           </a:fontRef>
         </p:style>
       </p:cxnSp>
-      <mc:AlternateContent xmlns:mc="http://schemas.openxmlformats.org/markup-compatibility/2006">
-        <mc:Choice xmlns:a14="http://schemas.microsoft.com/office/drawing/2010/main" Requires="a14">
+      <mc:AlternateContent xmlns:mc="http://schemas.openxmlformats.org/markup-compatibility/2006" xmlns:a14="http://schemas.microsoft.com/office/drawing/2010/main">
+        <mc:Choice Requires="a14">
           <p:sp>
             <p:nvSpPr>
               <p:cNvPr id="36" name="TextBox 35">
@@ -4264,7 +4265,7 @@
             </p:txBody>
           </p:sp>
         </mc:Choice>
-        <mc:Fallback>
+        <mc:Fallback xmlns="">
           <p:sp>
             <p:nvSpPr>
               <p:cNvPr id="36" name="TextBox 35">
@@ -4348,8 +4349,8 @@
           </a:fontRef>
         </p:style>
       </p:cxnSp>
-      <mc:AlternateContent xmlns:mc="http://schemas.openxmlformats.org/markup-compatibility/2006">
-        <mc:Choice xmlns:a14="http://schemas.microsoft.com/office/drawing/2010/main" Requires="a14">
+      <mc:AlternateContent xmlns:mc="http://schemas.openxmlformats.org/markup-compatibility/2006" xmlns:a14="http://schemas.microsoft.com/office/drawing/2010/main">
+        <mc:Choice Requires="a14">
           <p:sp>
             <p:nvSpPr>
               <p:cNvPr id="38" name="TextBox 37">
@@ -4432,7 +4433,7 @@
             </p:txBody>
           </p:sp>
         </mc:Choice>
-        <mc:Fallback>
+        <mc:Fallback xmlns="">
           <p:sp>
             <p:nvSpPr>
               <p:cNvPr id="38" name="TextBox 37">
@@ -4516,8 +4517,8 @@
           </a:fontRef>
         </p:style>
       </p:cxnSp>
-      <mc:AlternateContent xmlns:mc="http://schemas.openxmlformats.org/markup-compatibility/2006">
-        <mc:Choice xmlns:a14="http://schemas.microsoft.com/office/drawing/2010/main" Requires="a14">
+      <mc:AlternateContent xmlns:mc="http://schemas.openxmlformats.org/markup-compatibility/2006" xmlns:a14="http://schemas.microsoft.com/office/drawing/2010/main">
+        <mc:Choice Requires="a14">
           <p:sp>
             <p:nvSpPr>
               <p:cNvPr id="40" name="TextBox 39">
@@ -4600,7 +4601,7 @@
             </p:txBody>
           </p:sp>
         </mc:Choice>
-        <mc:Fallback>
+        <mc:Fallback xmlns="">
           <p:sp>
             <p:nvSpPr>
               <p:cNvPr id="40" name="TextBox 39">
@@ -4684,8 +4685,8 @@
           </a:fontRef>
         </p:style>
       </p:cxnSp>
-      <mc:AlternateContent xmlns:mc="http://schemas.openxmlformats.org/markup-compatibility/2006">
-        <mc:Choice xmlns:a14="http://schemas.microsoft.com/office/drawing/2010/main" Requires="a14">
+      <mc:AlternateContent xmlns:mc="http://schemas.openxmlformats.org/markup-compatibility/2006" xmlns:a14="http://schemas.microsoft.com/office/drawing/2010/main">
+        <mc:Choice Requires="a14">
           <p:sp>
             <p:nvSpPr>
               <p:cNvPr id="42" name="TextBox 41">
@@ -4773,7 +4774,7 @@
             </p:txBody>
           </p:sp>
         </mc:Choice>
-        <mc:Fallback>
+        <mc:Fallback xmlns="">
           <p:sp>
             <p:nvSpPr>
               <p:cNvPr id="42" name="TextBox 41">
@@ -4941,8 +4942,8 @@
           </a:fontRef>
         </p:style>
       </p:cxnSp>
-      <mc:AlternateContent xmlns:mc="http://schemas.openxmlformats.org/markup-compatibility/2006">
-        <mc:Choice xmlns:a14="http://schemas.microsoft.com/office/drawing/2010/main" Requires="a14">
+      <mc:AlternateContent xmlns:mc="http://schemas.openxmlformats.org/markup-compatibility/2006" xmlns:a14="http://schemas.microsoft.com/office/drawing/2010/main">
+        <mc:Choice Requires="a14">
           <p:sp>
             <p:nvSpPr>
               <p:cNvPr id="51" name="TextBox 50">
@@ -5030,7 +5031,7 @@
             </p:txBody>
           </p:sp>
         </mc:Choice>
-        <mc:Fallback>
+        <mc:Fallback xmlns="">
           <p:sp>
             <p:nvSpPr>
               <p:cNvPr id="51" name="TextBox 50">
@@ -5075,8 +5076,8 @@
           </p:sp>
         </mc:Fallback>
       </mc:AlternateContent>
-      <mc:AlternateContent xmlns:mc="http://schemas.openxmlformats.org/markup-compatibility/2006">
-        <mc:Choice xmlns:a14="http://schemas.microsoft.com/office/drawing/2010/main" Requires="a14">
+      <mc:AlternateContent xmlns:mc="http://schemas.openxmlformats.org/markup-compatibility/2006" xmlns:a14="http://schemas.microsoft.com/office/drawing/2010/main">
+        <mc:Choice Requires="a14">
           <p:sp>
             <p:nvSpPr>
               <p:cNvPr id="54" name="TextBox 53">
@@ -5164,7 +5165,7 @@
             </p:txBody>
           </p:sp>
         </mc:Choice>
-        <mc:Fallback>
+        <mc:Fallback xmlns="">
           <p:sp>
             <p:nvSpPr>
               <p:cNvPr id="54" name="TextBox 53">
@@ -5209,8 +5210,8 @@
           </p:sp>
         </mc:Fallback>
       </mc:AlternateContent>
-      <mc:AlternateContent xmlns:mc="http://schemas.openxmlformats.org/markup-compatibility/2006">
-        <mc:Choice xmlns:a14="http://schemas.microsoft.com/office/drawing/2010/main" Requires="a14">
+      <mc:AlternateContent xmlns:mc="http://schemas.openxmlformats.org/markup-compatibility/2006" xmlns:a14="http://schemas.microsoft.com/office/drawing/2010/main">
+        <mc:Choice Requires="a14">
           <p:sp>
             <p:nvSpPr>
               <p:cNvPr id="60" name="TextBox 59">
@@ -5298,7 +5299,7 @@
             </p:txBody>
           </p:sp>
         </mc:Choice>
-        <mc:Fallback>
+        <mc:Fallback xmlns="">
           <p:sp>
             <p:nvSpPr>
               <p:cNvPr id="60" name="TextBox 59">
@@ -5343,8 +5344,8 @@
           </p:sp>
         </mc:Fallback>
       </mc:AlternateContent>
-      <mc:AlternateContent xmlns:mc="http://schemas.openxmlformats.org/markup-compatibility/2006">
-        <mc:Choice xmlns:a14="http://schemas.microsoft.com/office/drawing/2010/main" Requires="a14">
+      <mc:AlternateContent xmlns:mc="http://schemas.openxmlformats.org/markup-compatibility/2006" xmlns:a14="http://schemas.microsoft.com/office/drawing/2010/main">
+        <mc:Choice Requires="a14">
           <p:sp>
             <p:nvSpPr>
               <p:cNvPr id="61" name="TextBox 60">
@@ -5432,7 +5433,7 @@
             </p:txBody>
           </p:sp>
         </mc:Choice>
-        <mc:Fallback>
+        <mc:Fallback xmlns="">
           <p:sp>
             <p:nvSpPr>
               <p:cNvPr id="61" name="TextBox 60">
@@ -5477,8 +5478,8 @@
           </p:sp>
         </mc:Fallback>
       </mc:AlternateContent>
-      <mc:AlternateContent xmlns:mc="http://schemas.openxmlformats.org/markup-compatibility/2006">
-        <mc:Choice xmlns:a14="http://schemas.microsoft.com/office/drawing/2010/main" Requires="a14">
+      <mc:AlternateContent xmlns:mc="http://schemas.openxmlformats.org/markup-compatibility/2006" xmlns:a14="http://schemas.microsoft.com/office/drawing/2010/main">
+        <mc:Choice Requires="a14">
           <p:sp>
             <p:nvSpPr>
               <p:cNvPr id="62" name="TextBox 61">
@@ -5566,7 +5567,7 @@
             </p:txBody>
           </p:sp>
         </mc:Choice>
-        <mc:Fallback>
+        <mc:Fallback xmlns="">
           <p:sp>
             <p:nvSpPr>
               <p:cNvPr id="62" name="TextBox 61">
@@ -5611,8 +5612,8 @@
           </p:sp>
         </mc:Fallback>
       </mc:AlternateContent>
-      <mc:AlternateContent xmlns:mc="http://schemas.openxmlformats.org/markup-compatibility/2006">
-        <mc:Choice xmlns:a14="http://schemas.microsoft.com/office/drawing/2010/main" Requires="a14">
+      <mc:AlternateContent xmlns:mc="http://schemas.openxmlformats.org/markup-compatibility/2006" xmlns:a14="http://schemas.microsoft.com/office/drawing/2010/main">
+        <mc:Choice Requires="a14">
           <p:sp>
             <p:nvSpPr>
               <p:cNvPr id="63" name="TextBox 62">
@@ -5700,7 +5701,7 @@
             </p:txBody>
           </p:sp>
         </mc:Choice>
-        <mc:Fallback>
+        <mc:Fallback xmlns="">
           <p:sp>
             <p:nvSpPr>
               <p:cNvPr id="63" name="TextBox 62">
@@ -5745,8 +5746,8 @@
           </p:sp>
         </mc:Fallback>
       </mc:AlternateContent>
-      <mc:AlternateContent xmlns:mc="http://schemas.openxmlformats.org/markup-compatibility/2006">
-        <mc:Choice xmlns:a14="http://schemas.microsoft.com/office/drawing/2010/main" Requires="a14">
+      <mc:AlternateContent xmlns:mc="http://schemas.openxmlformats.org/markup-compatibility/2006" xmlns:a14="http://schemas.microsoft.com/office/drawing/2010/main">
+        <mc:Choice Requires="a14">
           <p:sp>
             <p:nvSpPr>
               <p:cNvPr id="64" name="TextBox 63">
@@ -5834,7 +5835,7 @@
             </p:txBody>
           </p:sp>
         </mc:Choice>
-        <mc:Fallback>
+        <mc:Fallback xmlns="">
           <p:sp>
             <p:nvSpPr>
               <p:cNvPr id="64" name="TextBox 63">
@@ -5879,8 +5880,8 @@
           </p:sp>
         </mc:Fallback>
       </mc:AlternateContent>
-      <mc:AlternateContent xmlns:mc="http://schemas.openxmlformats.org/markup-compatibility/2006">
-        <mc:Choice xmlns:a14="http://schemas.microsoft.com/office/drawing/2010/main" Requires="a14">
+      <mc:AlternateContent xmlns:mc="http://schemas.openxmlformats.org/markup-compatibility/2006" xmlns:a14="http://schemas.microsoft.com/office/drawing/2010/main">
+        <mc:Choice Requires="a14">
           <p:sp>
             <p:nvSpPr>
               <p:cNvPr id="65" name="TextBox 64">
@@ -5968,7 +5969,7 @@
             </p:txBody>
           </p:sp>
         </mc:Choice>
-        <mc:Fallback>
+        <mc:Fallback xmlns="">
           <p:sp>
             <p:nvSpPr>
               <p:cNvPr id="65" name="TextBox 64">
@@ -6017,6 +6018,748 @@
     <p:extLst>
       <p:ext uri="{BB962C8B-B14F-4D97-AF65-F5344CB8AC3E}">
         <p14:creationId xmlns:p14="http://schemas.microsoft.com/office/powerpoint/2010/main" val="2746717939"/>
+      </p:ext>
+    </p:extLst>
+  </p:cSld>
+  <p:clrMapOvr>
+    <a:masterClrMapping/>
+  </p:clrMapOvr>
+</p:sld>
+</file>
+
+<file path=ppt/slides/slide2.xml><?xml version="1.0" encoding="utf-8"?>
+<p:sld xmlns:a="http://schemas.openxmlformats.org/drawingml/2006/main" xmlns:r="http://schemas.openxmlformats.org/officeDocument/2006/relationships" xmlns:p="http://schemas.openxmlformats.org/presentationml/2006/main">
+  <p:cSld>
+    <p:spTree>
+      <p:nvGrpSpPr>
+        <p:cNvPr id="1" name=""/>
+        <p:cNvGrpSpPr/>
+        <p:nvPr/>
+      </p:nvGrpSpPr>
+      <p:grpSpPr>
+        <a:xfrm>
+          <a:off x="0" y="0"/>
+          <a:ext cx="0" cy="0"/>
+          <a:chOff x="0" y="0"/>
+          <a:chExt cx="0" cy="0"/>
+        </a:xfrm>
+      </p:grpSpPr>
+      <p:sp>
+        <p:nvSpPr>
+          <p:cNvPr id="2" name="Rectangle 1">
+            <a:extLst>
+              <a:ext uri="{FF2B5EF4-FFF2-40B4-BE49-F238E27FC236}">
+                <a16:creationId xmlns:a16="http://schemas.microsoft.com/office/drawing/2014/main" id="{0A3E9491-7B1C-4CE7-B80D-1F992714B53D}"/>
+              </a:ext>
+            </a:extLst>
+          </p:cNvPr>
+          <p:cNvSpPr/>
+          <p:nvPr/>
+        </p:nvSpPr>
+        <p:spPr>
+          <a:xfrm>
+            <a:off x="1602297" y="636456"/>
+            <a:ext cx="2567031" cy="548445"/>
+          </a:xfrm>
+          <a:prstGeom prst="rect">
+            <a:avLst/>
+          </a:prstGeom>
+        </p:spPr>
+        <p:style>
+          <a:lnRef idx="2">
+            <a:schemeClr val="accent3">
+              <a:shade val="50000"/>
+            </a:schemeClr>
+          </a:lnRef>
+          <a:fillRef idx="1">
+            <a:schemeClr val="accent3"/>
+          </a:fillRef>
+          <a:effectRef idx="0">
+            <a:schemeClr val="accent3"/>
+          </a:effectRef>
+          <a:fontRef idx="minor">
+            <a:schemeClr val="lt1"/>
+          </a:fontRef>
+        </p:style>
+        <p:txBody>
+          <a:bodyPr rtlCol="0" anchor="ctr"/>
+          <a:lstStyle/>
+          <a:p>
+            <a:pPr algn="ctr"/>
+            <a:r>
+              <a:rPr lang="en-GB" sz="1600" dirty="0"/>
+              <a:t>Individual mortality/LE data</a:t>
+            </a:r>
+            <a:endParaRPr lang="de-DE" sz="1600" dirty="0"/>
+          </a:p>
+        </p:txBody>
+      </p:sp>
+      <p:sp>
+        <p:nvSpPr>
+          <p:cNvPr id="44" name="Rectangle 43">
+            <a:extLst>
+              <a:ext uri="{FF2B5EF4-FFF2-40B4-BE49-F238E27FC236}">
+                <a16:creationId xmlns:a16="http://schemas.microsoft.com/office/drawing/2014/main" id="{9C9B04F9-2CFD-4D8D-B9BE-61D3D6863198}"/>
+              </a:ext>
+            </a:extLst>
+          </p:cNvPr>
+          <p:cNvSpPr/>
+          <p:nvPr/>
+        </p:nvSpPr>
+        <p:spPr>
+          <a:xfrm>
+            <a:off x="1602296" y="1294651"/>
+            <a:ext cx="2567031" cy="548445"/>
+          </a:xfrm>
+          <a:prstGeom prst="rect">
+            <a:avLst/>
+          </a:prstGeom>
+          <a:solidFill>
+            <a:srgbClr val="D83C30"/>
+          </a:solidFill>
+          <a:ln>
+            <a:noFill/>
+          </a:ln>
+        </p:spPr>
+        <p:style>
+          <a:lnRef idx="2">
+            <a:schemeClr val="accent1">
+              <a:shade val="50000"/>
+            </a:schemeClr>
+          </a:lnRef>
+          <a:fillRef idx="1">
+            <a:schemeClr val="accent1"/>
+          </a:fillRef>
+          <a:effectRef idx="0">
+            <a:schemeClr val="accent1"/>
+          </a:effectRef>
+          <a:fontRef idx="minor">
+            <a:schemeClr val="lt1"/>
+          </a:fontRef>
+        </p:style>
+        <p:txBody>
+          <a:bodyPr rtlCol="0" anchor="ctr"/>
+          <a:lstStyle/>
+          <a:p>
+            <a:pPr algn="ctr"/>
+            <a:r>
+              <a:rPr lang="en-GB" sz="1600" dirty="0"/>
+              <a:t>Aggregate mortality/LE data</a:t>
+            </a:r>
+            <a:endParaRPr lang="de-DE" sz="1600" dirty="0"/>
+          </a:p>
+        </p:txBody>
+      </p:sp>
+      <p:sp>
+        <p:nvSpPr>
+          <p:cNvPr id="46" name="Rectangle 45">
+            <a:extLst>
+              <a:ext uri="{FF2B5EF4-FFF2-40B4-BE49-F238E27FC236}">
+                <a16:creationId xmlns:a16="http://schemas.microsoft.com/office/drawing/2014/main" id="{E4733DAA-BF59-4609-B85F-CC3F801A1C5C}"/>
+              </a:ext>
+            </a:extLst>
+          </p:cNvPr>
+          <p:cNvSpPr/>
+          <p:nvPr/>
+        </p:nvSpPr>
+        <p:spPr>
+          <a:xfrm>
+            <a:off x="4288172" y="636456"/>
+            <a:ext cx="2567031" cy="548445"/>
+          </a:xfrm>
+          <a:prstGeom prst="rect">
+            <a:avLst/>
+          </a:prstGeom>
+        </p:spPr>
+        <p:style>
+          <a:lnRef idx="2">
+            <a:schemeClr val="accent3">
+              <a:shade val="50000"/>
+            </a:schemeClr>
+          </a:lnRef>
+          <a:fillRef idx="1">
+            <a:schemeClr val="accent3"/>
+          </a:fillRef>
+          <a:effectRef idx="0">
+            <a:schemeClr val="accent3"/>
+          </a:effectRef>
+          <a:fontRef idx="minor">
+            <a:schemeClr val="lt1"/>
+          </a:fontRef>
+        </p:style>
+        <p:txBody>
+          <a:bodyPr rtlCol="0" anchor="ctr"/>
+          <a:lstStyle/>
+          <a:p>
+            <a:pPr algn="ctr"/>
+            <a:r>
+              <a:rPr lang="en-GB" sz="1600" dirty="0"/>
+              <a:t>Individual spending data</a:t>
+            </a:r>
+            <a:endParaRPr lang="de-DE" sz="1600" dirty="0"/>
+          </a:p>
+        </p:txBody>
+      </p:sp>
+      <p:sp>
+        <p:nvSpPr>
+          <p:cNvPr id="48" name="Rectangle 47">
+            <a:extLst>
+              <a:ext uri="{FF2B5EF4-FFF2-40B4-BE49-F238E27FC236}">
+                <a16:creationId xmlns:a16="http://schemas.microsoft.com/office/drawing/2014/main" id="{96D565EC-06DB-4CDF-9CD1-615B50205DA0}"/>
+              </a:ext>
+            </a:extLst>
+          </p:cNvPr>
+          <p:cNvSpPr/>
+          <p:nvPr/>
+        </p:nvSpPr>
+        <p:spPr>
+          <a:xfrm>
+            <a:off x="4288172" y="1294651"/>
+            <a:ext cx="2567031" cy="548445"/>
+          </a:xfrm>
+          <a:prstGeom prst="rect">
+            <a:avLst/>
+          </a:prstGeom>
+          <a:solidFill>
+            <a:srgbClr val="D83C30"/>
+          </a:solidFill>
+          <a:ln>
+            <a:noFill/>
+          </a:ln>
+        </p:spPr>
+        <p:style>
+          <a:lnRef idx="2">
+            <a:schemeClr val="accent1">
+              <a:shade val="50000"/>
+            </a:schemeClr>
+          </a:lnRef>
+          <a:fillRef idx="1">
+            <a:schemeClr val="accent1"/>
+          </a:fillRef>
+          <a:effectRef idx="0">
+            <a:schemeClr val="accent1"/>
+          </a:effectRef>
+          <a:fontRef idx="minor">
+            <a:schemeClr val="lt1"/>
+          </a:fontRef>
+        </p:style>
+        <p:txBody>
+          <a:bodyPr rtlCol="0" anchor="ctr"/>
+          <a:lstStyle/>
+          <a:p>
+            <a:pPr algn="ctr"/>
+            <a:r>
+              <a:rPr lang="en-GB" sz="1600" dirty="0"/>
+              <a:t>Aggregate spending data</a:t>
+            </a:r>
+            <a:endParaRPr lang="de-DE" sz="1600" dirty="0"/>
+          </a:p>
+        </p:txBody>
+      </p:sp>
+      <p:sp>
+        <p:nvSpPr>
+          <p:cNvPr id="50" name="Rectangle 49">
+            <a:extLst>
+              <a:ext uri="{FF2B5EF4-FFF2-40B4-BE49-F238E27FC236}">
+                <a16:creationId xmlns:a16="http://schemas.microsoft.com/office/drawing/2014/main" id="{743C28AE-D986-45BE-859C-4EB9EC486A54}"/>
+              </a:ext>
+            </a:extLst>
+          </p:cNvPr>
+          <p:cNvSpPr/>
+          <p:nvPr/>
+        </p:nvSpPr>
+        <p:spPr>
+          <a:xfrm>
+            <a:off x="1602296" y="1971880"/>
+            <a:ext cx="5252907" cy="319980"/>
+          </a:xfrm>
+          <a:prstGeom prst="rect">
+            <a:avLst/>
+          </a:prstGeom>
+          <a:noFill/>
+          <a:ln>
+            <a:solidFill>
+              <a:srgbClr val="D83C30"/>
+            </a:solidFill>
+          </a:ln>
+        </p:spPr>
+        <p:style>
+          <a:lnRef idx="2">
+            <a:schemeClr val="accent1">
+              <a:shade val="50000"/>
+            </a:schemeClr>
+          </a:lnRef>
+          <a:fillRef idx="1">
+            <a:schemeClr val="accent1"/>
+          </a:fillRef>
+          <a:effectRef idx="0">
+            <a:schemeClr val="accent1"/>
+          </a:effectRef>
+          <a:fontRef idx="minor">
+            <a:schemeClr val="lt1"/>
+          </a:fontRef>
+        </p:style>
+        <p:txBody>
+          <a:bodyPr rtlCol="0" anchor="ctr"/>
+          <a:lstStyle/>
+          <a:p>
+            <a:pPr algn="ctr"/>
+            <a:r>
+              <a:rPr lang="en-GB" sz="1600" dirty="0">
+                <a:solidFill>
+                  <a:schemeClr val="tx1"/>
+                </a:solidFill>
+              </a:rPr>
+              <a:t>Health system level (large t required) </a:t>
+            </a:r>
+            <a:endParaRPr lang="de-DE" sz="1600" dirty="0">
+              <a:solidFill>
+                <a:schemeClr val="tx1"/>
+              </a:solidFill>
+            </a:endParaRPr>
+          </a:p>
+        </p:txBody>
+      </p:sp>
+      <p:sp>
+        <p:nvSpPr>
+          <p:cNvPr id="3" name="TextBox 2">
+            <a:extLst>
+              <a:ext uri="{FF2B5EF4-FFF2-40B4-BE49-F238E27FC236}">
+                <a16:creationId xmlns:a16="http://schemas.microsoft.com/office/drawing/2014/main" id="{FCFF6B8B-92BB-4819-84F0-A95701625543}"/>
+              </a:ext>
+            </a:extLst>
+          </p:cNvPr>
+          <p:cNvSpPr txBox="1"/>
+          <p:nvPr/>
+        </p:nvSpPr>
+        <p:spPr>
+          <a:xfrm rot="2879293">
+            <a:off x="2603501" y="901185"/>
+            <a:ext cx="1003300" cy="369332"/>
+          </a:xfrm>
+          <a:prstGeom prst="rect">
+            <a:avLst/>
+          </a:prstGeom>
+          <a:noFill/>
+        </p:spPr>
+        <p:txBody>
+          <a:bodyPr wrap="square" rtlCol="0">
+            <a:spAutoFit/>
+          </a:bodyPr>
+          <a:lstStyle/>
+          <a:p>
+            <a:r>
+              <a:rPr lang="en-GB" dirty="0"/>
+              <a:t>NA</a:t>
+            </a:r>
+            <a:endParaRPr lang="de-DE" dirty="0"/>
+          </a:p>
+        </p:txBody>
+      </p:sp>
+      <p:sp>
+        <p:nvSpPr>
+          <p:cNvPr id="52" name="TextBox 51">
+            <a:extLst>
+              <a:ext uri="{FF2B5EF4-FFF2-40B4-BE49-F238E27FC236}">
+                <a16:creationId xmlns:a16="http://schemas.microsoft.com/office/drawing/2014/main" id="{53C66EBD-353D-4602-B10C-816A8FAF55B1}"/>
+              </a:ext>
+            </a:extLst>
+          </p:cNvPr>
+          <p:cNvSpPr txBox="1"/>
+          <p:nvPr/>
+        </p:nvSpPr>
+        <p:spPr>
+          <a:xfrm rot="2879293">
+            <a:off x="5170531" y="901184"/>
+            <a:ext cx="1003300" cy="369332"/>
+          </a:xfrm>
+          <a:prstGeom prst="rect">
+            <a:avLst/>
+          </a:prstGeom>
+          <a:noFill/>
+        </p:spPr>
+        <p:txBody>
+          <a:bodyPr wrap="square" rtlCol="0">
+            <a:spAutoFit/>
+          </a:bodyPr>
+          <a:lstStyle/>
+          <a:p>
+            <a:r>
+              <a:rPr lang="en-GB" dirty="0"/>
+              <a:t>NA</a:t>
+            </a:r>
+            <a:endParaRPr lang="de-DE" dirty="0"/>
+          </a:p>
+        </p:txBody>
+      </p:sp>
+      <p:sp>
+        <p:nvSpPr>
+          <p:cNvPr id="53" name="Rectangle 52">
+            <a:extLst>
+              <a:ext uri="{FF2B5EF4-FFF2-40B4-BE49-F238E27FC236}">
+                <a16:creationId xmlns:a16="http://schemas.microsoft.com/office/drawing/2014/main" id="{D4227A18-62BC-49C9-BC5F-AEC35EEE9BBD}"/>
+              </a:ext>
+            </a:extLst>
+          </p:cNvPr>
+          <p:cNvSpPr/>
+          <p:nvPr/>
+        </p:nvSpPr>
+        <p:spPr>
+          <a:xfrm>
+            <a:off x="1602297" y="3361361"/>
+            <a:ext cx="5252906" cy="319980"/>
+          </a:xfrm>
+          <a:prstGeom prst="rect">
+            <a:avLst/>
+          </a:prstGeom>
+          <a:noFill/>
+          <a:ln>
+            <a:solidFill>
+              <a:srgbClr val="D83C30"/>
+            </a:solidFill>
+          </a:ln>
+        </p:spPr>
+        <p:style>
+          <a:lnRef idx="2">
+            <a:schemeClr val="accent1">
+              <a:shade val="50000"/>
+            </a:schemeClr>
+          </a:lnRef>
+          <a:fillRef idx="1">
+            <a:schemeClr val="accent1"/>
+          </a:fillRef>
+          <a:effectRef idx="0">
+            <a:schemeClr val="accent1"/>
+          </a:effectRef>
+          <a:fontRef idx="minor">
+            <a:schemeClr val="lt1"/>
+          </a:fontRef>
+        </p:style>
+        <p:txBody>
+          <a:bodyPr rtlCol="0" anchor="ctr"/>
+          <a:lstStyle/>
+          <a:p>
+            <a:pPr algn="ctr"/>
+            <a:r>
+              <a:rPr lang="en-GB" sz="1600" dirty="0">
+                <a:solidFill>
+                  <a:schemeClr val="tx1"/>
+                </a:solidFill>
+              </a:rPr>
+              <a:t>Regional level (larger n)</a:t>
+            </a:r>
+            <a:endParaRPr lang="de-DE" sz="1600" dirty="0">
+              <a:solidFill>
+                <a:schemeClr val="tx1"/>
+              </a:solidFill>
+            </a:endParaRPr>
+          </a:p>
+        </p:txBody>
+      </p:sp>
+      <p:sp>
+        <p:nvSpPr>
+          <p:cNvPr id="56" name="Rectangle 55">
+            <a:extLst>
+              <a:ext uri="{FF2B5EF4-FFF2-40B4-BE49-F238E27FC236}">
+                <a16:creationId xmlns:a16="http://schemas.microsoft.com/office/drawing/2014/main" id="{15AB945B-9BF2-448A-8E2B-77674452BC7B}"/>
+              </a:ext>
+            </a:extLst>
+          </p:cNvPr>
+          <p:cNvSpPr/>
+          <p:nvPr/>
+        </p:nvSpPr>
+        <p:spPr>
+          <a:xfrm>
+            <a:off x="4288172" y="2368758"/>
+            <a:ext cx="2567031" cy="915705"/>
+          </a:xfrm>
+          <a:prstGeom prst="rect">
+            <a:avLst/>
+          </a:prstGeom>
+          <a:noFill/>
+          <a:ln>
+            <a:noFill/>
+          </a:ln>
+        </p:spPr>
+        <p:style>
+          <a:lnRef idx="2">
+            <a:schemeClr val="accent1">
+              <a:shade val="50000"/>
+            </a:schemeClr>
+          </a:lnRef>
+          <a:fillRef idx="1">
+            <a:schemeClr val="accent1"/>
+          </a:fillRef>
+          <a:effectRef idx="0">
+            <a:schemeClr val="accent1"/>
+          </a:effectRef>
+          <a:fontRef idx="minor">
+            <a:schemeClr val="lt1"/>
+          </a:fontRef>
+        </p:style>
+        <p:txBody>
+          <a:bodyPr rtlCol="0" anchor="ctr"/>
+          <a:lstStyle/>
+          <a:p>
+            <a:pPr marL="171450" indent="-171450">
+              <a:buFont typeface="Arial" panose="020B0604020202020204" pitchFamily="34" charset="0"/>
+              <a:buChar char="•"/>
+            </a:pPr>
+            <a:r>
+              <a:rPr lang="en-GB" sz="1200" dirty="0">
+                <a:solidFill>
+                  <a:schemeClr val="tx1"/>
+                </a:solidFill>
+              </a:rPr>
+              <a:t>COI studies (</a:t>
+            </a:r>
+            <a:r>
+              <a:rPr lang="de-DE" sz="1200" dirty="0">
+                <a:solidFill>
+                  <a:schemeClr val="tx1"/>
+                </a:solidFill>
+              </a:rPr>
+              <a:t>2002, 2004, 2006, 2008, 2015, but 2015 not comparable)</a:t>
+            </a:r>
+          </a:p>
+          <a:p>
+            <a:pPr marL="171450" indent="-171450">
+              <a:buFont typeface="Arial" panose="020B0604020202020204" pitchFamily="34" charset="0"/>
+              <a:buChar char="•"/>
+            </a:pPr>
+            <a:r>
+              <a:rPr lang="de-DE" sz="1200" dirty="0">
+                <a:solidFill>
+                  <a:schemeClr val="tx1"/>
+                </a:solidFill>
+              </a:rPr>
+              <a:t>DRG data (available from 2007)</a:t>
+            </a:r>
+          </a:p>
+          <a:p>
+            <a:pPr marL="171450" indent="-171450">
+              <a:buFont typeface="Arial" panose="020B0604020202020204" pitchFamily="34" charset="0"/>
+              <a:buChar char="•"/>
+            </a:pPr>
+            <a:r>
+              <a:rPr lang="de-DE" sz="1200" b="1" dirty="0">
+                <a:solidFill>
+                  <a:schemeClr val="tx1"/>
+                </a:solidFill>
+              </a:rPr>
+              <a:t>Outpatient spending?</a:t>
+            </a:r>
+          </a:p>
+        </p:txBody>
+      </p:sp>
+      <p:sp>
+        <p:nvSpPr>
+          <p:cNvPr id="57" name="Rectangle 56">
+            <a:extLst>
+              <a:ext uri="{FF2B5EF4-FFF2-40B4-BE49-F238E27FC236}">
+                <a16:creationId xmlns:a16="http://schemas.microsoft.com/office/drawing/2014/main" id="{5F68D66C-2CAB-4EFB-A8A9-EE0AA8578EC4}"/>
+              </a:ext>
+            </a:extLst>
+          </p:cNvPr>
+          <p:cNvSpPr/>
+          <p:nvPr/>
+        </p:nvSpPr>
+        <p:spPr>
+          <a:xfrm>
+            <a:off x="1602295" y="2368967"/>
+            <a:ext cx="2567031" cy="915705"/>
+          </a:xfrm>
+          <a:prstGeom prst="rect">
+            <a:avLst/>
+          </a:prstGeom>
+          <a:noFill/>
+          <a:ln>
+            <a:noFill/>
+          </a:ln>
+        </p:spPr>
+        <p:style>
+          <a:lnRef idx="2">
+            <a:schemeClr val="accent1">
+              <a:shade val="50000"/>
+            </a:schemeClr>
+          </a:lnRef>
+          <a:fillRef idx="1">
+            <a:schemeClr val="accent1"/>
+          </a:fillRef>
+          <a:effectRef idx="0">
+            <a:schemeClr val="accent1"/>
+          </a:effectRef>
+          <a:fontRef idx="minor">
+            <a:schemeClr val="lt1"/>
+          </a:fontRef>
+        </p:style>
+        <p:txBody>
+          <a:bodyPr rtlCol="0" anchor="ctr"/>
+          <a:lstStyle/>
+          <a:p>
+            <a:pPr marL="171450" indent="-171450">
+              <a:buFont typeface="Arial" panose="020B0604020202020204" pitchFamily="34" charset="0"/>
+              <a:buChar char="•"/>
+            </a:pPr>
+            <a:r>
+              <a:rPr lang="en-GB" sz="1200" dirty="0">
+                <a:solidFill>
+                  <a:schemeClr val="tx1"/>
+                </a:solidFill>
+              </a:rPr>
+              <a:t>Life tables (age, gender but not region or ICD level)</a:t>
+            </a:r>
+          </a:p>
+          <a:p>
+            <a:pPr marL="171450" indent="-171450">
+              <a:buFont typeface="Arial" panose="020B0604020202020204" pitchFamily="34" charset="0"/>
+              <a:buChar char="•"/>
+            </a:pPr>
+            <a:r>
+              <a:rPr lang="en-GB" sz="1200" dirty="0">
+                <a:solidFill>
+                  <a:schemeClr val="tx1"/>
+                </a:solidFill>
+              </a:rPr>
+              <a:t>Mortality statistics (age, gender, region, ICD level)</a:t>
+            </a:r>
+            <a:endParaRPr lang="de-DE" sz="1200" dirty="0">
+              <a:solidFill>
+                <a:schemeClr val="tx1"/>
+              </a:solidFill>
+            </a:endParaRPr>
+          </a:p>
+        </p:txBody>
+      </p:sp>
+      <p:sp>
+        <p:nvSpPr>
+          <p:cNvPr id="58" name="Rectangle 57">
+            <a:extLst>
+              <a:ext uri="{FF2B5EF4-FFF2-40B4-BE49-F238E27FC236}">
+                <a16:creationId xmlns:a16="http://schemas.microsoft.com/office/drawing/2014/main" id="{DB42445C-88AF-40A3-9F5A-9C196E256E6C}"/>
+              </a:ext>
+            </a:extLst>
+          </p:cNvPr>
+          <p:cNvSpPr/>
+          <p:nvPr/>
+        </p:nvSpPr>
+        <p:spPr>
+          <a:xfrm>
+            <a:off x="4288172" y="3758031"/>
+            <a:ext cx="2567031" cy="319980"/>
+          </a:xfrm>
+          <a:prstGeom prst="rect">
+            <a:avLst/>
+          </a:prstGeom>
+          <a:noFill/>
+          <a:ln>
+            <a:noFill/>
+          </a:ln>
+        </p:spPr>
+        <p:style>
+          <a:lnRef idx="2">
+            <a:schemeClr val="accent1">
+              <a:shade val="50000"/>
+            </a:schemeClr>
+          </a:lnRef>
+          <a:fillRef idx="1">
+            <a:schemeClr val="accent1"/>
+          </a:fillRef>
+          <a:effectRef idx="0">
+            <a:schemeClr val="accent1"/>
+          </a:effectRef>
+          <a:fontRef idx="minor">
+            <a:schemeClr val="lt1"/>
+          </a:fontRef>
+        </p:style>
+        <p:txBody>
+          <a:bodyPr rtlCol="0" anchor="ctr"/>
+          <a:lstStyle/>
+          <a:p>
+            <a:pPr marL="171450" indent="-171450">
+              <a:buFont typeface="Arial" panose="020B0604020202020204" pitchFamily="34" charset="0"/>
+              <a:buChar char="•"/>
+            </a:pPr>
+            <a:r>
+              <a:rPr lang="de-DE" sz="1200" u="sng" dirty="0">
+                <a:solidFill>
+                  <a:schemeClr val="tx1"/>
+                </a:solidFill>
+              </a:rPr>
+              <a:t>DRG data</a:t>
+            </a:r>
+          </a:p>
+        </p:txBody>
+      </p:sp>
+      <p:sp>
+        <p:nvSpPr>
+          <p:cNvPr id="59" name="Rectangle 58">
+            <a:extLst>
+              <a:ext uri="{FF2B5EF4-FFF2-40B4-BE49-F238E27FC236}">
+                <a16:creationId xmlns:a16="http://schemas.microsoft.com/office/drawing/2014/main" id="{ED2B0C8E-6B4E-4CF4-BB35-D625D02EB837}"/>
+              </a:ext>
+            </a:extLst>
+          </p:cNvPr>
+          <p:cNvSpPr/>
+          <p:nvPr/>
+        </p:nvSpPr>
+        <p:spPr>
+          <a:xfrm>
+            <a:off x="1602295" y="3758240"/>
+            <a:ext cx="2567031" cy="319980"/>
+          </a:xfrm>
+          <a:prstGeom prst="rect">
+            <a:avLst/>
+          </a:prstGeom>
+          <a:noFill/>
+          <a:ln>
+            <a:noFill/>
+          </a:ln>
+        </p:spPr>
+        <p:style>
+          <a:lnRef idx="2">
+            <a:schemeClr val="accent1">
+              <a:shade val="50000"/>
+            </a:schemeClr>
+          </a:lnRef>
+          <a:fillRef idx="1">
+            <a:schemeClr val="accent1"/>
+          </a:fillRef>
+          <a:effectRef idx="0">
+            <a:schemeClr val="accent1"/>
+          </a:effectRef>
+          <a:fontRef idx="minor">
+            <a:schemeClr val="lt1"/>
+          </a:fontRef>
+        </p:style>
+        <p:txBody>
+          <a:bodyPr rtlCol="0" anchor="ctr"/>
+          <a:lstStyle/>
+          <a:p>
+            <a:pPr marL="171450" indent="-171450">
+              <a:buFont typeface="Arial" panose="020B0604020202020204" pitchFamily="34" charset="0"/>
+              <a:buChar char="•"/>
+            </a:pPr>
+            <a:r>
+              <a:rPr lang="en-GB" sz="1200" u="sng" dirty="0">
+                <a:solidFill>
+                  <a:schemeClr val="tx1"/>
+                </a:solidFill>
+              </a:rPr>
+              <a:t>Mortality statistics</a:t>
+            </a:r>
+            <a:endParaRPr lang="de-DE" sz="1200" u="sng" dirty="0">
+              <a:solidFill>
+                <a:schemeClr val="tx1"/>
+              </a:solidFill>
+            </a:endParaRPr>
+          </a:p>
+        </p:txBody>
+      </p:sp>
+    </p:spTree>
+    <p:extLst>
+      <p:ext uri="{BB962C8B-B14F-4D97-AF65-F5344CB8AC3E}">
+        <p14:creationId xmlns:p14="http://schemas.microsoft.com/office/powerpoint/2010/main" val="3055922566"/>
       </p:ext>
     </p:extLst>
   </p:cSld>

</xml_diff>